<commit_message>
misspelling in pptx resolved
</commit_message>
<xml_diff>
--- a/CICD for SQL Server DBs in Azure DevOps.pptx
+++ b/CICD for SQL Server DBs in Azure DevOps.pptx
@@ -5808,7 +5808,7 @@
           <a:p>
             <a:fld id="{1036C169-70BF-412B-BAB2-4313ADDFA40A}" type="datetimeFigureOut">
               <a:rPr lang="fa-IR" smtClean="0"/>
-              <a:t>19/11/1443</a:t>
+              <a:t>20/11/1443</a:t>
             </a:fld>
             <a:endParaRPr lang="fa-IR"/>
           </a:p>
@@ -6070,7 +6070,7 @@
           <a:p>
             <a:fld id="{1036C169-70BF-412B-BAB2-4313ADDFA40A}" type="datetimeFigureOut">
               <a:rPr lang="fa-IR" smtClean="0"/>
-              <a:t>19/11/1443</a:t>
+              <a:t>20/11/1443</a:t>
             </a:fld>
             <a:endParaRPr lang="fa-IR"/>
           </a:p>
@@ -6305,7 +6305,7 @@
           <a:p>
             <a:fld id="{1036C169-70BF-412B-BAB2-4313ADDFA40A}" type="datetimeFigureOut">
               <a:rPr lang="fa-IR" smtClean="0"/>
-              <a:t>19/11/1443</a:t>
+              <a:t>20/11/1443</a:t>
             </a:fld>
             <a:endParaRPr lang="fa-IR"/>
           </a:p>
@@ -6545,7 +6545,7 @@
           <a:p>
             <a:fld id="{1036C169-70BF-412B-BAB2-4313ADDFA40A}" type="datetimeFigureOut">
               <a:rPr lang="fa-IR" smtClean="0"/>
-              <a:t>19/11/1443</a:t>
+              <a:t>20/11/1443</a:t>
             </a:fld>
             <a:endParaRPr lang="fa-IR"/>
           </a:p>
@@ -6852,7 +6852,7 @@
           <a:p>
             <a:fld id="{1036C169-70BF-412B-BAB2-4313ADDFA40A}" type="datetimeFigureOut">
               <a:rPr lang="fa-IR" smtClean="0"/>
-              <a:t>19/11/1443</a:t>
+              <a:t>20/11/1443</a:t>
             </a:fld>
             <a:endParaRPr lang="fa-IR"/>
           </a:p>
@@ -7154,7 +7154,7 @@
           <a:p>
             <a:fld id="{1036C169-70BF-412B-BAB2-4313ADDFA40A}" type="datetimeFigureOut">
               <a:rPr lang="fa-IR" smtClean="0"/>
-              <a:t>19/11/1443</a:t>
+              <a:t>20/11/1443</a:t>
             </a:fld>
             <a:endParaRPr lang="fa-IR"/>
           </a:p>
@@ -7576,7 +7576,7 @@
           <a:p>
             <a:fld id="{1036C169-70BF-412B-BAB2-4313ADDFA40A}" type="datetimeFigureOut">
               <a:rPr lang="fa-IR" smtClean="0"/>
-              <a:t>19/11/1443</a:t>
+              <a:t>20/11/1443</a:t>
             </a:fld>
             <a:endParaRPr lang="fa-IR"/>
           </a:p>
@@ -7671,7 +7671,7 @@
           <a:p>
             <a:fld id="{1036C169-70BF-412B-BAB2-4313ADDFA40A}" type="datetimeFigureOut">
               <a:rPr lang="fa-IR" smtClean="0"/>
-              <a:t>19/11/1443</a:t>
+              <a:t>20/11/1443</a:t>
             </a:fld>
             <a:endParaRPr lang="fa-IR"/>
           </a:p>
@@ -7833,7 +7833,7 @@
           <a:p>
             <a:fld id="{1036C169-70BF-412B-BAB2-4313ADDFA40A}" type="datetimeFigureOut">
               <a:rPr lang="fa-IR" smtClean="0"/>
-              <a:t>19/11/1443</a:t>
+              <a:t>20/11/1443</a:t>
             </a:fld>
             <a:endParaRPr lang="fa-IR"/>
           </a:p>
@@ -8211,7 +8211,7 @@
           <a:p>
             <a:fld id="{1036C169-70BF-412B-BAB2-4313ADDFA40A}" type="datetimeFigureOut">
               <a:rPr lang="fa-IR" smtClean="0"/>
-              <a:t>19/11/1443</a:t>
+              <a:t>20/11/1443</a:t>
             </a:fld>
             <a:endParaRPr lang="fa-IR"/>
           </a:p>
@@ -8500,7 +8500,7 @@
           <a:p>
             <a:fld id="{1036C169-70BF-412B-BAB2-4313ADDFA40A}" type="datetimeFigureOut">
               <a:rPr lang="fa-IR" smtClean="0"/>
-              <a:t>19/11/1443</a:t>
+              <a:t>20/11/1443</a:t>
             </a:fld>
             <a:endParaRPr lang="fa-IR"/>
           </a:p>
@@ -8711,7 +8711,7 @@
           <a:p>
             <a:fld id="{1036C169-70BF-412B-BAB2-4313ADDFA40A}" type="datetimeFigureOut">
               <a:rPr lang="fa-IR" smtClean="0"/>
-              <a:t>19/11/1443</a:t>
+              <a:t>20/11/1443</a:t>
             </a:fld>
             <a:endParaRPr lang="fa-IR"/>
           </a:p>
@@ -9403,7 +9403,7 @@
                 </a:solidFill>
                 <a:latin typeface="Segoe-Semibold"/>
               </a:rPr>
-              <a:t>CI/CD for sql server databases in Azure DevOps</a:t>
+              <a:t>CI/CD for SQL Server Databases in Azure DevOps</a:t>
             </a:r>
             <a:endParaRPr lang="en-US" sz="4000" dirty="0">
               <a:solidFill>
@@ -11170,12 +11170,20 @@
               <a:buNone/>
             </a:pPr>
             <a:r>
+              <a:rPr lang="en-US" sz="4800">
+                <a:solidFill>
+                  <a:srgbClr val="0070C0"/>
+                </a:solidFill>
+              </a:rPr>
+              <a:t>Why </a:t>
+            </a:r>
+            <a:r>
               <a:rPr lang="en-US" sz="4800" dirty="0">
                 <a:solidFill>
                   <a:srgbClr val="0070C0"/>
                 </a:solidFill>
               </a:rPr>
-              <a:t>What Database DevOps is Important?</a:t>
+              <a:t>Database DevOps is Important?</a:t>
             </a:r>
           </a:p>
         </p:txBody>

</xml_diff>